<commit_message>
Added Submodule + PPT Advance!
</commit_message>
<xml_diff>
--- a/TensionApp.pptx
+++ b/TensionApp.pptx
@@ -17,7 +17,10 @@
     <p:sldId id="265" r:id="rId11"/>
     <p:sldId id="266" r:id="rId12"/>
     <p:sldId id="267" r:id="rId13"/>
-    <p:sldId id="268" r:id="rId14"/>
+    <p:sldId id="269" r:id="rId14"/>
+    <p:sldId id="270" r:id="rId15"/>
+    <p:sldId id="271" r:id="rId16"/>
+    <p:sldId id="268" r:id="rId17"/>
   </p:sldIdLst>
   <p:sldSz cx="12192000" cy="6858000"/>
   <p:notesSz cx="6858000" cy="9144000"/>
@@ -116,6 +119,11 @@
       </a:defRPr>
     </a:lvl9pPr>
   </p:defaultTextStyle>
+  <p:extLst>
+    <p:ext uri="{EFAFB233-063F-42B5-8137-9DF3F51BA10A}">
+      <p15:sldGuideLst xmlns:p15="http://schemas.microsoft.com/office/powerpoint/2012/main"/>
+    </p:ext>
+  </p:extLst>
 </p:presentation>
 </file>
 
@@ -278,7 +286,7 @@
           <a:p>
             <a:fld id="{B031D900-605A-404A-8C05-08FC83ECAA79}" type="datetimeFigureOut">
               <a:rPr lang="en-US" smtClean="0"/>
-              <a:t>07-Mar-20</a:t>
+              <a:t>08-Mar-20</a:t>
             </a:fld>
             <a:endParaRPr lang="en-US"/>
           </a:p>
@@ -476,7 +484,7 @@
           <a:p>
             <a:fld id="{B031D900-605A-404A-8C05-08FC83ECAA79}" type="datetimeFigureOut">
               <a:rPr lang="en-US" smtClean="0"/>
-              <a:t>07-Mar-20</a:t>
+              <a:t>08-Mar-20</a:t>
             </a:fld>
             <a:endParaRPr lang="en-US"/>
           </a:p>
@@ -684,7 +692,7 @@
           <a:p>
             <a:fld id="{B031D900-605A-404A-8C05-08FC83ECAA79}" type="datetimeFigureOut">
               <a:rPr lang="en-US" smtClean="0"/>
-              <a:t>07-Mar-20</a:t>
+              <a:t>08-Mar-20</a:t>
             </a:fld>
             <a:endParaRPr lang="en-US"/>
           </a:p>
@@ -882,7 +890,7 @@
           <a:p>
             <a:fld id="{B031D900-605A-404A-8C05-08FC83ECAA79}" type="datetimeFigureOut">
               <a:rPr lang="en-US" smtClean="0"/>
-              <a:t>07-Mar-20</a:t>
+              <a:t>08-Mar-20</a:t>
             </a:fld>
             <a:endParaRPr lang="en-US"/>
           </a:p>
@@ -1157,7 +1165,7 @@
           <a:p>
             <a:fld id="{B031D900-605A-404A-8C05-08FC83ECAA79}" type="datetimeFigureOut">
               <a:rPr lang="en-US" smtClean="0"/>
-              <a:t>07-Mar-20</a:t>
+              <a:t>08-Mar-20</a:t>
             </a:fld>
             <a:endParaRPr lang="en-US"/>
           </a:p>
@@ -1422,7 +1430,7 @@
           <a:p>
             <a:fld id="{B031D900-605A-404A-8C05-08FC83ECAA79}" type="datetimeFigureOut">
               <a:rPr lang="en-US" smtClean="0"/>
-              <a:t>07-Mar-20</a:t>
+              <a:t>08-Mar-20</a:t>
             </a:fld>
             <a:endParaRPr lang="en-US"/>
           </a:p>
@@ -1834,7 +1842,7 @@
           <a:p>
             <a:fld id="{B031D900-605A-404A-8C05-08FC83ECAA79}" type="datetimeFigureOut">
               <a:rPr lang="en-US" smtClean="0"/>
-              <a:t>07-Mar-20</a:t>
+              <a:t>08-Mar-20</a:t>
             </a:fld>
             <a:endParaRPr lang="en-US"/>
           </a:p>
@@ -1975,7 +1983,7 @@
           <a:p>
             <a:fld id="{B031D900-605A-404A-8C05-08FC83ECAA79}" type="datetimeFigureOut">
               <a:rPr lang="en-US" smtClean="0"/>
-              <a:t>07-Mar-20</a:t>
+              <a:t>08-Mar-20</a:t>
             </a:fld>
             <a:endParaRPr lang="en-US"/>
           </a:p>
@@ -2088,7 +2096,7 @@
           <a:p>
             <a:fld id="{B031D900-605A-404A-8C05-08FC83ECAA79}" type="datetimeFigureOut">
               <a:rPr lang="en-US" smtClean="0"/>
-              <a:t>07-Mar-20</a:t>
+              <a:t>08-Mar-20</a:t>
             </a:fld>
             <a:endParaRPr lang="en-US"/>
           </a:p>
@@ -2399,7 +2407,7 @@
           <a:p>
             <a:fld id="{B031D900-605A-404A-8C05-08FC83ECAA79}" type="datetimeFigureOut">
               <a:rPr lang="en-US" smtClean="0"/>
-              <a:t>07-Mar-20</a:t>
+              <a:t>08-Mar-20</a:t>
             </a:fld>
             <a:endParaRPr lang="en-US"/>
           </a:p>
@@ -2687,7 +2695,7 @@
           <a:p>
             <a:fld id="{B031D900-605A-404A-8C05-08FC83ECAA79}" type="datetimeFigureOut">
               <a:rPr lang="en-US" smtClean="0"/>
-              <a:t>07-Mar-20</a:t>
+              <a:t>08-Mar-20</a:t>
             </a:fld>
             <a:endParaRPr lang="en-US"/>
           </a:p>
@@ -2928,7 +2936,7 @@
           <a:p>
             <a:fld id="{B031D900-605A-404A-8C05-08FC83ECAA79}" type="datetimeFigureOut">
               <a:rPr lang="en-US" smtClean="0"/>
-              <a:t>07-Mar-20</a:t>
+              <a:t>08-Mar-20</a:t>
             </a:fld>
             <a:endParaRPr lang="en-US"/>
           </a:p>
@@ -3677,12 +3685,102 @@
           </a:p>
         </p:txBody>
       </p:sp>
+      <p:sp>
+        <p:nvSpPr>
+          <p:cNvPr id="6" name="TextBox 5">
+            <a:extLst>
+              <a:ext uri="{FF2B5EF4-FFF2-40B4-BE49-F238E27FC236}">
+                <a16:creationId xmlns:a16="http://schemas.microsoft.com/office/drawing/2014/main" id="{1D4A8A49-AA11-424E-AA74-5E3E9BA4DA5A}"/>
+              </a:ext>
+            </a:extLst>
+          </p:cNvPr>
+          <p:cNvSpPr txBox="1"/>
+          <p:nvPr/>
+        </p:nvSpPr>
+        <p:spPr>
+          <a:xfrm>
+            <a:off x="9395314" y="6331927"/>
+            <a:ext cx="2552700" cy="369332"/>
+          </a:xfrm>
+          <a:prstGeom prst="rect">
+            <a:avLst/>
+          </a:prstGeom>
+          <a:noFill/>
+        </p:spPr>
+        <p:txBody>
+          <a:bodyPr wrap="square" rtlCol="0">
+            <a:spAutoFit/>
+          </a:bodyPr>
+          <a:lstStyle/>
+          <a:p>
+            <a:pPr algn="r"/>
+            <a:r>
+              <a:rPr lang="en-US" dirty="0"/>
+              <a:t>Miguel Fuertes</a:t>
+            </a:r>
+          </a:p>
+        </p:txBody>
+      </p:sp>
+      <p:sp>
+        <p:nvSpPr>
+          <p:cNvPr id="9" name="Rectangle 8">
+            <a:extLst>
+              <a:ext uri="{FF2B5EF4-FFF2-40B4-BE49-F238E27FC236}">
+                <a16:creationId xmlns:a16="http://schemas.microsoft.com/office/drawing/2014/main" id="{00F05541-0834-4E35-84BB-453437C294CE}"/>
+              </a:ext>
+            </a:extLst>
+          </p:cNvPr>
+          <p:cNvSpPr/>
+          <p:nvPr/>
+        </p:nvSpPr>
+        <p:spPr>
+          <a:xfrm>
+            <a:off x="-228600" y="-70338"/>
+            <a:ext cx="6506308" cy="7095392"/>
+          </a:xfrm>
+          <a:prstGeom prst="rect">
+            <a:avLst/>
+          </a:prstGeom>
+          <a:solidFill>
+            <a:srgbClr val="795548"/>
+          </a:solidFill>
+          <a:ln w="38100">
+            <a:solidFill>
+              <a:schemeClr val="tx1"/>
+            </a:solidFill>
+          </a:ln>
+        </p:spPr>
+        <p:style>
+          <a:lnRef idx="2">
+            <a:schemeClr val="accent1">
+              <a:shade val="50000"/>
+            </a:schemeClr>
+          </a:lnRef>
+          <a:fillRef idx="1">
+            <a:schemeClr val="accent1"/>
+          </a:fillRef>
+          <a:effectRef idx="0">
+            <a:schemeClr val="accent1"/>
+          </a:effectRef>
+          <a:fontRef idx="minor">
+            <a:schemeClr val="lt1"/>
+          </a:fontRef>
+        </p:style>
+        <p:txBody>
+          <a:bodyPr rtlCol="0" anchor="ctr"/>
+          <a:lstStyle/>
+          <a:p>
+            <a:pPr algn="ctr"/>
+            <a:endParaRPr lang="es-ES_tradnl" dirty="0"/>
+          </a:p>
+        </p:txBody>
+      </p:sp>
       <p:pic>
         <p:nvPicPr>
-          <p:cNvPr id="5" name="Picture 4" descr="A close up of a logo&#10;&#10;Description automatically generated">
-            <a:extLst>
-              <a:ext uri="{FF2B5EF4-FFF2-40B4-BE49-F238E27FC236}">
-                <a16:creationId xmlns:a16="http://schemas.microsoft.com/office/drawing/2014/main" id="{1FD63415-46DE-4003-B7C8-0DD8981D167C}"/>
+          <p:cNvPr id="8" name="Picture 7" descr="A close up of a logo&#10;&#10;Description automatically generated">
+            <a:extLst>
+              <a:ext uri="{FF2B5EF4-FFF2-40B4-BE49-F238E27FC236}">
+                <a16:creationId xmlns:a16="http://schemas.microsoft.com/office/drawing/2014/main" id="{73FE0A50-9C23-486E-8E9D-40DB4E07D8BC}"/>
               </a:ext>
             </a:extLst>
           </p:cNvPr>
@@ -3691,207 +3789,29 @@
           </p:cNvPicPr>
           <p:nvPr/>
         </p:nvPicPr>
-        <p:blipFill rotWithShape="1">
+        <p:blipFill>
           <a:blip r:embed="rId2">
+            <a:lum bright="70000" contrast="-70000"/>
             <a:extLst>
               <a:ext uri="{28A0092B-C50C-407E-A947-70E740481C1C}">
                 <a14:useLocalDpi xmlns:a14="http://schemas.microsoft.com/office/drawing/2010/main" val="0"/>
               </a:ext>
             </a:extLst>
           </a:blip>
-          <a:srcRect l="6019" r="6140"/>
-          <a:stretch/>
+          <a:stretch>
+            <a:fillRect/>
+          </a:stretch>
         </p:blipFill>
         <p:spPr>
           <a:xfrm>
-            <a:off x="20" y="10"/>
-            <a:ext cx="6024134" cy="6857990"/>
-          </a:xfrm>
-          <a:custGeom>
-            <a:avLst/>
-            <a:gdLst/>
-            <a:ahLst/>
-            <a:cxnLst/>
-            <a:rect l="l" t="t" r="r" b="b"/>
-            <a:pathLst>
-              <a:path w="6024154" h="6858000">
-                <a:moveTo>
-                  <a:pt x="0" y="0"/>
-                </a:moveTo>
-                <a:lnTo>
-                  <a:pt x="5953780" y="0"/>
-                </a:lnTo>
-                <a:lnTo>
-                  <a:pt x="5989880" y="284091"/>
-                </a:lnTo>
-                <a:cubicBezTo>
-                  <a:pt x="6012544" y="507260"/>
-                  <a:pt x="6024154" y="733696"/>
-                  <a:pt x="6024154" y="962844"/>
-                </a:cubicBezTo>
-                <a:cubicBezTo>
-                  <a:pt x="6024154" y="3483472"/>
-                  <a:pt x="4619336" y="5675986"/>
-                  <a:pt x="2549934" y="6800152"/>
-                </a:cubicBezTo>
-                <a:lnTo>
-                  <a:pt x="2436987" y="6858000"/>
-                </a:lnTo>
-                <a:lnTo>
-                  <a:pt x="0" y="6858000"/>
-                </a:lnTo>
-                <a:close/>
-              </a:path>
-            </a:pathLst>
-          </a:custGeom>
-        </p:spPr>
-      </p:pic>
-      <p:sp>
-        <p:nvSpPr>
-          <p:cNvPr id="6" name="TextBox 5">
-            <a:extLst>
-              <a:ext uri="{FF2B5EF4-FFF2-40B4-BE49-F238E27FC236}">
-                <a16:creationId xmlns:a16="http://schemas.microsoft.com/office/drawing/2014/main" id="{1D4A8A49-AA11-424E-AA74-5E3E9BA4DA5A}"/>
-              </a:ext>
-            </a:extLst>
-          </p:cNvPr>
-          <p:cNvSpPr txBox="1"/>
-          <p:nvPr/>
-        </p:nvSpPr>
-        <p:spPr>
-          <a:xfrm>
-            <a:off x="9395314" y="6331927"/>
-            <a:ext cx="2552700" cy="369332"/>
+            <a:off x="3041368" y="3477358"/>
+            <a:ext cx="2599364" cy="2599364"/>
           </a:xfrm>
           <a:prstGeom prst="rect">
             <a:avLst/>
           </a:prstGeom>
-          <a:noFill/>
-        </p:spPr>
-        <p:txBody>
-          <a:bodyPr wrap="square" rtlCol="0">
-            <a:spAutoFit/>
-          </a:bodyPr>
-          <a:lstStyle/>
-          <a:p>
-            <a:pPr algn="r"/>
-            <a:r>
-              <a:rPr lang="en-US" dirty="0"/>
-              <a:t>Miguel Fuertes</a:t>
-            </a:r>
-          </a:p>
-        </p:txBody>
-      </p:sp>
-      <p:grpSp>
-        <p:nvGrpSpPr>
-          <p:cNvPr id="11" name="Group 10">
-            <a:extLst>
-              <a:ext uri="{FF2B5EF4-FFF2-40B4-BE49-F238E27FC236}">
-                <a16:creationId xmlns:a16="http://schemas.microsoft.com/office/drawing/2014/main" id="{65B7B760-6099-4E7D-B2E3-F8A562C5BCAC}"/>
-              </a:ext>
-            </a:extLst>
-          </p:cNvPr>
-          <p:cNvGrpSpPr/>
-          <p:nvPr/>
-        </p:nvGrpSpPr>
-        <p:grpSpPr>
-          <a:xfrm>
-            <a:off x="1468315" y="1987062"/>
-            <a:ext cx="3015762" cy="2763831"/>
-            <a:chOff x="1468315" y="1987062"/>
-            <a:chExt cx="3015762" cy="2763831"/>
-          </a:xfrm>
-        </p:grpSpPr>
-        <p:sp>
-          <p:nvSpPr>
-            <p:cNvPr id="9" name="Rectangle 8">
-              <a:extLst>
-                <a:ext uri="{FF2B5EF4-FFF2-40B4-BE49-F238E27FC236}">
-                  <a16:creationId xmlns:a16="http://schemas.microsoft.com/office/drawing/2014/main" id="{00F05541-0834-4E35-84BB-453437C294CE}"/>
-                </a:ext>
-              </a:extLst>
-            </p:cNvPr>
-            <p:cNvSpPr/>
-            <p:nvPr/>
-          </p:nvSpPr>
-          <p:spPr>
-            <a:xfrm>
-              <a:off x="1468315" y="1987062"/>
-              <a:ext cx="3015762" cy="2763831"/>
-            </a:xfrm>
-            <a:prstGeom prst="rect">
-              <a:avLst/>
-            </a:prstGeom>
-            <a:solidFill>
-              <a:srgbClr val="795548"/>
-            </a:solidFill>
-            <a:ln>
-              <a:noFill/>
-            </a:ln>
-          </p:spPr>
-          <p:style>
-            <a:lnRef idx="2">
-              <a:schemeClr val="accent1">
-                <a:shade val="50000"/>
-              </a:schemeClr>
-            </a:lnRef>
-            <a:fillRef idx="1">
-              <a:schemeClr val="accent1"/>
-            </a:fillRef>
-            <a:effectRef idx="0">
-              <a:schemeClr val="accent1"/>
-            </a:effectRef>
-            <a:fontRef idx="minor">
-              <a:schemeClr val="lt1"/>
-            </a:fontRef>
-          </p:style>
-          <p:txBody>
-            <a:bodyPr rtlCol="0" anchor="ctr"/>
-            <a:lstStyle/>
-            <a:p>
-              <a:pPr algn="ctr"/>
-              <a:endParaRPr lang="es-ES_tradnl"/>
-            </a:p>
-          </p:txBody>
-        </p:sp>
-        <p:pic>
-          <p:nvPicPr>
-            <p:cNvPr id="8" name="Picture 7" descr="A close up of a logo&#10;&#10;Description automatically generated">
-              <a:extLst>
-                <a:ext uri="{FF2B5EF4-FFF2-40B4-BE49-F238E27FC236}">
-                  <a16:creationId xmlns:a16="http://schemas.microsoft.com/office/drawing/2014/main" id="{73FE0A50-9C23-486E-8E9D-40DB4E07D8BC}"/>
-                </a:ext>
-              </a:extLst>
-            </p:cNvPr>
-            <p:cNvPicPr>
-              <a:picLocks noChangeAspect="1"/>
-            </p:cNvPicPr>
-            <p:nvPr/>
-          </p:nvPicPr>
-          <p:blipFill>
-            <a:blip r:embed="rId3">
-              <a:lum bright="70000" contrast="-70000"/>
-              <a:extLst>
-                <a:ext uri="{28A0092B-C50C-407E-A947-70E740481C1C}">
-                  <a14:useLocalDpi xmlns:a14="http://schemas.microsoft.com/office/drawing/2010/main" val="0"/>
-                </a:ext>
-              </a:extLst>
-            </a:blip>
-            <a:stretch>
-              <a:fillRect/>
-            </a:stretch>
-          </p:blipFill>
-          <p:spPr>
-            <a:xfrm>
-              <a:off x="1647320" y="2129318"/>
-              <a:ext cx="2599364" cy="2599364"/>
-            </a:xfrm>
-            <a:prstGeom prst="rect">
-              <a:avLst/>
-            </a:prstGeom>
-          </p:spPr>
-        </p:pic>
-      </p:grpSp>
+        </p:spPr>
+      </p:pic>
     </p:spTree>
     <p:extLst>
       <p:ext uri="{BB962C8B-B14F-4D97-AF65-F5344CB8AC3E}">
@@ -4233,10 +4153,10 @@
       </p:sp>
       <p:sp>
         <p:nvSpPr>
-          <p:cNvPr id="5" name="TextBox 4">
-            <a:extLst>
-              <a:ext uri="{FF2B5EF4-FFF2-40B4-BE49-F238E27FC236}">
-                <a16:creationId xmlns:a16="http://schemas.microsoft.com/office/drawing/2014/main" id="{45743434-6740-48D4-9AA3-877FA2A21E33}"/>
+          <p:cNvPr id="7" name="TextBox 6">
+            <a:extLst>
+              <a:ext uri="{FF2B5EF4-FFF2-40B4-BE49-F238E27FC236}">
+                <a16:creationId xmlns:a16="http://schemas.microsoft.com/office/drawing/2014/main" id="{A8D828DA-09E7-469D-B8B3-EF01DF860745}"/>
               </a:ext>
             </a:extLst>
           </p:cNvPr>
@@ -4299,10 +4219,256 @@
 <file path=ppt/slides/slide12.xml><?xml version="1.0" encoding="utf-8"?>
 <p:sld xmlns:a="http://schemas.openxmlformats.org/drawingml/2006/main" xmlns:r="http://schemas.openxmlformats.org/officeDocument/2006/relationships" xmlns:p="http://schemas.openxmlformats.org/presentationml/2006/main">
   <p:cSld>
+    <p:spTree>
+      <p:nvGrpSpPr>
+        <p:cNvPr id="1" name=""/>
+        <p:cNvGrpSpPr/>
+        <p:nvPr/>
+      </p:nvGrpSpPr>
+      <p:grpSpPr>
+        <a:xfrm>
+          <a:off x="0" y="0"/>
+          <a:ext cx="0" cy="0"/>
+          <a:chOff x="0" y="0"/>
+          <a:chExt cx="0" cy="0"/>
+        </a:xfrm>
+      </p:grpSpPr>
+      <p:sp>
+        <p:nvSpPr>
+          <p:cNvPr id="12" name="Rectangle 11">
+            <a:extLst>
+              <a:ext uri="{FF2B5EF4-FFF2-40B4-BE49-F238E27FC236}">
+                <a16:creationId xmlns:a16="http://schemas.microsoft.com/office/drawing/2014/main" id="{4EB16812-7D5F-4B72-8676-26C19E31057C}"/>
+              </a:ext>
+            </a:extLst>
+          </p:cNvPr>
+          <p:cNvSpPr/>
+          <p:nvPr/>
+        </p:nvSpPr>
+        <p:spPr>
+          <a:xfrm>
+            <a:off x="-368300" y="-749300"/>
+            <a:ext cx="12979400" cy="2932873"/>
+          </a:xfrm>
+          <a:prstGeom prst="rect">
+            <a:avLst/>
+          </a:prstGeom>
+          <a:solidFill>
+            <a:srgbClr val="795548"/>
+          </a:solidFill>
+          <a:ln w="38100">
+            <a:solidFill>
+              <a:srgbClr val="3F3F3F"/>
+            </a:solidFill>
+          </a:ln>
+        </p:spPr>
+        <p:style>
+          <a:lnRef idx="2">
+            <a:schemeClr val="accent1">
+              <a:shade val="50000"/>
+            </a:schemeClr>
+          </a:lnRef>
+          <a:fillRef idx="1">
+            <a:schemeClr val="accent1"/>
+          </a:fillRef>
+          <a:effectRef idx="0">
+            <a:schemeClr val="accent1"/>
+          </a:effectRef>
+          <a:fontRef idx="minor">
+            <a:schemeClr val="lt1"/>
+          </a:fontRef>
+        </p:style>
+        <p:txBody>
+          <a:bodyPr rtlCol="0" anchor="ctr"/>
+          <a:lstStyle/>
+          <a:p>
+            <a:pPr algn="ctr"/>
+            <a:endParaRPr lang="es-ES"/>
+          </a:p>
+        </p:txBody>
+      </p:sp>
+      <p:sp>
+        <p:nvSpPr>
+          <p:cNvPr id="2" name="Title 1">
+            <a:extLst>
+              <a:ext uri="{FF2B5EF4-FFF2-40B4-BE49-F238E27FC236}">
+                <a16:creationId xmlns:a16="http://schemas.microsoft.com/office/drawing/2014/main" id="{C043F681-95B9-4B4D-9AA6-F9365F5FA1E6}"/>
+              </a:ext>
+            </a:extLst>
+          </p:cNvPr>
+          <p:cNvSpPr>
+            <a:spLocks noGrp="1"/>
+          </p:cNvSpPr>
+          <p:nvPr>
+            <p:ph type="title"/>
+          </p:nvPr>
+        </p:nvSpPr>
+        <p:spPr>
+          <a:xfrm>
+            <a:off x="4622800" y="1435100"/>
+            <a:ext cx="7404100" cy="748473"/>
+          </a:xfrm>
+        </p:spPr>
+        <p:txBody>
+          <a:bodyPr/>
+          <a:lstStyle/>
+          <a:p>
+            <a:pPr algn="r"/>
+            <a:r>
+              <a:rPr lang="en-US" i="1" dirty="0" err="1">
+                <a:solidFill>
+                  <a:schemeClr val="bg1"/>
+                </a:solidFill>
+              </a:rPr>
+              <a:t>Captura</a:t>
+            </a:r>
+            <a:r>
+              <a:rPr lang="en-US" i="1" dirty="0">
+                <a:solidFill>
+                  <a:schemeClr val="bg1"/>
+                </a:solidFill>
+              </a:rPr>
+              <a:t> del </a:t>
+            </a:r>
+            <a:r>
+              <a:rPr lang="en-US" i="1" dirty="0" err="1">
+                <a:solidFill>
+                  <a:schemeClr val="bg1"/>
+                </a:solidFill>
+              </a:rPr>
+              <a:t>pulso</a:t>
+            </a:r>
+            <a:r>
+              <a:rPr lang="en-US" i="1" dirty="0">
+                <a:solidFill>
+                  <a:schemeClr val="bg1"/>
+                </a:solidFill>
+              </a:rPr>
+              <a:t>: </a:t>
+            </a:r>
+            <a:r>
+              <a:rPr lang="en-US" b="1" dirty="0">
+                <a:solidFill>
+                  <a:schemeClr val="bg1"/>
+                </a:solidFill>
+              </a:rPr>
+              <a:t>Arduino</a:t>
+            </a:r>
+          </a:p>
+        </p:txBody>
+      </p:sp>
+      <p:sp>
+        <p:nvSpPr>
+          <p:cNvPr id="7" name="TextBox 6">
+            <a:extLst>
+              <a:ext uri="{FF2B5EF4-FFF2-40B4-BE49-F238E27FC236}">
+                <a16:creationId xmlns:a16="http://schemas.microsoft.com/office/drawing/2014/main" id="{82F09C45-0835-4838-A56A-3FEC0381C478}"/>
+              </a:ext>
+            </a:extLst>
+          </p:cNvPr>
+          <p:cNvSpPr txBox="1"/>
+          <p:nvPr/>
+        </p:nvSpPr>
+        <p:spPr>
+          <a:xfrm>
+            <a:off x="5797897" y="2766440"/>
+            <a:ext cx="5615354" cy="2862322"/>
+          </a:xfrm>
+          <a:prstGeom prst="rect">
+            <a:avLst/>
+          </a:prstGeom>
+          <a:noFill/>
+          <a:ln w="38100">
+            <a:noFill/>
+          </a:ln>
+        </p:spPr>
+        <p:txBody>
+          <a:bodyPr wrap="square" rtlCol="0">
+            <a:spAutoFit/>
+          </a:bodyPr>
+          <a:lstStyle/>
+          <a:p>
+            <a:r>
+              <a:rPr lang="es-ES_tradnl" dirty="0"/>
+              <a:t>El Arduino (en nuestro caso el WemosD1) se conecta con el sensor (MAX30100) mediante el protocolo I2C, que es un protocolo serie para interconexión de controladores.</a:t>
+            </a:r>
+          </a:p>
+          <a:p>
+            <a:endParaRPr lang="es-ES_tradnl" dirty="0"/>
+          </a:p>
+          <a:p>
+            <a:r>
+              <a:rPr lang="es-ES_tradnl" dirty="0"/>
+              <a:t>Al ser Serial, solo hacen falta dos hilos para realizar la conexión (D1,D2). Los otros dos son 3.3v y tierra.</a:t>
+            </a:r>
+          </a:p>
+          <a:p>
+            <a:endParaRPr lang="es-ES_tradnl" dirty="0"/>
+          </a:p>
+          <a:p>
+            <a:r>
+              <a:rPr lang="es-ES_tradnl" dirty="0"/>
+              <a:t>La alimentación le llega al Arduino mediante su conexión (micro) USB con el smartphone. Hace falta un adaptador OTG para poder conectarlo al smartphone.</a:t>
+            </a:r>
+          </a:p>
+        </p:txBody>
+      </p:sp>
+      <p:pic>
+        <p:nvPicPr>
+          <p:cNvPr id="4" name="Picture 3" descr="A circuit board&#10;&#10;Description automatically generated">
+            <a:extLst>
+              <a:ext uri="{FF2B5EF4-FFF2-40B4-BE49-F238E27FC236}">
+                <a16:creationId xmlns:a16="http://schemas.microsoft.com/office/drawing/2014/main" id="{2167E10A-E1A7-41C1-AB05-E72EAC8E5F42}"/>
+              </a:ext>
+            </a:extLst>
+          </p:cNvPr>
+          <p:cNvPicPr>
+            <a:picLocks noChangeAspect="1"/>
+          </p:cNvPicPr>
+          <p:nvPr/>
+        </p:nvPicPr>
+        <p:blipFill>
+          <a:blip r:embed="rId2">
+            <a:extLst>
+              <a:ext uri="{28A0092B-C50C-407E-A947-70E740481C1C}">
+                <a14:useLocalDpi xmlns:a14="http://schemas.microsoft.com/office/drawing/2010/main" val="0"/>
+              </a:ext>
+            </a:extLst>
+          </a:blip>
+          <a:stretch>
+            <a:fillRect/>
+          </a:stretch>
+        </p:blipFill>
+        <p:spPr>
+          <a:xfrm>
+            <a:off x="463601" y="2766440"/>
+            <a:ext cx="4516647" cy="3559202"/>
+          </a:xfrm>
+          <a:prstGeom prst="rect">
+            <a:avLst/>
+          </a:prstGeom>
+        </p:spPr>
+      </p:pic>
+    </p:spTree>
+    <p:extLst>
+      <p:ext uri="{BB962C8B-B14F-4D97-AF65-F5344CB8AC3E}">
+        <p14:creationId xmlns:p14="http://schemas.microsoft.com/office/powerpoint/2010/main" val="549060676"/>
+      </p:ext>
+    </p:extLst>
+  </p:cSld>
+  <p:clrMapOvr>
+    <a:masterClrMapping/>
+  </p:clrMapOvr>
+</p:sld>
+</file>
+
+<file path=ppt/slides/slide13.xml><?xml version="1.0" encoding="utf-8"?>
+<p:sld xmlns:a="http://schemas.openxmlformats.org/drawingml/2006/main" xmlns:r="http://schemas.openxmlformats.org/officeDocument/2006/relationships" xmlns:p="http://schemas.openxmlformats.org/presentationml/2006/main">
+  <p:cSld>
     <p:bg>
       <p:bgPr>
         <a:solidFill>
-          <a:srgbClr val="3F3F3F"/>
+          <a:srgbClr val="1E1E1E"/>
         </a:solidFill>
         <a:effectLst/>
       </p:bgPr>
@@ -4321,6 +4487,36 @@
           <a:chExt cx="0" cy="0"/>
         </a:xfrm>
       </p:grpSpPr>
+      <p:pic>
+        <p:nvPicPr>
+          <p:cNvPr id="8" name="Picture 7">
+            <a:extLst>
+              <a:ext uri="{FF2B5EF4-FFF2-40B4-BE49-F238E27FC236}">
+                <a16:creationId xmlns:a16="http://schemas.microsoft.com/office/drawing/2014/main" id="{046B9059-CEC4-4C67-927D-A72EA9AE8DB7}"/>
+              </a:ext>
+            </a:extLst>
+          </p:cNvPr>
+          <p:cNvPicPr>
+            <a:picLocks noChangeAspect="1"/>
+          </p:cNvPicPr>
+          <p:nvPr/>
+        </p:nvPicPr>
+        <p:blipFill>
+          <a:blip r:embed="rId2"/>
+          <a:stretch>
+            <a:fillRect/>
+          </a:stretch>
+        </p:blipFill>
+        <p:spPr>
+          <a:xfrm>
+            <a:off x="202223" y="1099646"/>
+            <a:ext cx="7136422" cy="5758354"/>
+          </a:xfrm>
+          <a:prstGeom prst="rect">
+            <a:avLst/>
+          </a:prstGeom>
+        </p:spPr>
+      </p:pic>
       <p:sp>
         <p:nvSpPr>
           <p:cNvPr id="12" name="Rectangle 11">
@@ -4335,8 +4531,8 @@
         </p:nvSpPr>
         <p:spPr>
           <a:xfrm>
-            <a:off x="-368300" y="-749300"/>
-            <a:ext cx="12979400" cy="2932873"/>
+            <a:off x="-368300" y="-175845"/>
+            <a:ext cx="12979400" cy="1242796"/>
           </a:xfrm>
           <a:prstGeom prst="rect">
             <a:avLst/>
@@ -4393,7 +4589,7 @@
         </p:nvSpPr>
         <p:spPr>
           <a:xfrm>
-            <a:off x="4622800" y="1435100"/>
+            <a:off x="4622800" y="318478"/>
             <a:ext cx="7404100" cy="748473"/>
           </a:xfrm>
         </p:spPr>
@@ -4447,10 +4643,10 @@
       </p:sp>
       <p:sp>
         <p:nvSpPr>
-          <p:cNvPr id="5" name="TextBox 4">
-            <a:extLst>
-              <a:ext uri="{FF2B5EF4-FFF2-40B4-BE49-F238E27FC236}">
-                <a16:creationId xmlns:a16="http://schemas.microsoft.com/office/drawing/2014/main" id="{45743434-6740-48D4-9AA3-877FA2A21E33}"/>
+          <p:cNvPr id="9" name="TextBox 8">
+            <a:extLst>
+              <a:ext uri="{FF2B5EF4-FFF2-40B4-BE49-F238E27FC236}">
+                <a16:creationId xmlns:a16="http://schemas.microsoft.com/office/drawing/2014/main" id="{3EE3550D-A229-4687-A738-8699CD94D4F9}"/>
               </a:ext>
             </a:extLst>
           </p:cNvPr>
@@ -4459,13 +4655,16 @@
         </p:nvSpPr>
         <p:spPr>
           <a:xfrm>
-            <a:off x="4267200" y="4002479"/>
-            <a:ext cx="3657600" cy="584775"/>
+            <a:off x="6096000" y="1561274"/>
+            <a:ext cx="5615354" cy="3139321"/>
           </a:xfrm>
           <a:prstGeom prst="rect">
             <a:avLst/>
           </a:prstGeom>
           <a:noFill/>
+          <a:ln w="38100">
+            <a:noFill/>
+          </a:ln>
         </p:spPr>
         <p:txBody>
           <a:bodyPr wrap="square" rtlCol="0">
@@ -4473,34 +4672,151 @@
           </a:bodyPr>
           <a:lstStyle/>
           <a:p>
-            <a:pPr algn="ctr"/>
-            <a:r>
-              <a:rPr lang="es-ES_tradnl" sz="3200" dirty="0">
-                <a:solidFill>
-                  <a:schemeClr val="bg1"/>
-                </a:solidFill>
-                <a:hlinkClick r:id="rId2">
-                  <a:extLst>
-                    <a:ext uri="{A12FA001-AC4F-418D-AE19-62706E023703}">
-                      <ahyp:hlinkClr xmlns:ahyp="http://schemas.microsoft.com/office/drawing/2018/hyperlinkcolor" val="tx"/>
-                    </a:ext>
-                  </a:extLst>
-                </a:hlinkClick>
-              </a:rPr>
-              <a:t>Mas información </a:t>
-            </a:r>
-            <a:endParaRPr lang="es-ES_tradnl" sz="3200" dirty="0">
+            <a:r>
+              <a:rPr lang="es-ES_tradnl" dirty="0">
+                <a:solidFill>
+                  <a:schemeClr val="bg1"/>
+                </a:solidFill>
+              </a:rPr>
+              <a:t>Como todo Sketch de Arduino, el programa consta de dos partes principales, la función </a:t>
+            </a:r>
+            <a:r>
+              <a:rPr lang="es-ES_tradnl" dirty="0" err="1">
+                <a:solidFill>
+                  <a:schemeClr val="bg1"/>
+                </a:solidFill>
+              </a:rPr>
+              <a:t>setup</a:t>
+            </a:r>
+            <a:r>
+              <a:rPr lang="es-ES_tradnl" dirty="0">
+                <a:solidFill>
+                  <a:schemeClr val="bg1"/>
+                </a:solidFill>
+              </a:rPr>
+              <a:t>(), y la función </a:t>
+            </a:r>
+            <a:r>
+              <a:rPr lang="es-ES_tradnl" dirty="0" err="1">
+                <a:solidFill>
+                  <a:schemeClr val="bg1"/>
+                </a:solidFill>
+              </a:rPr>
+              <a:t>loop</a:t>
+            </a:r>
+            <a:r>
+              <a:rPr lang="es-ES_tradnl" dirty="0">
+                <a:solidFill>
+                  <a:schemeClr val="bg1"/>
+                </a:solidFill>
+              </a:rPr>
+              <a:t>().</a:t>
+            </a:r>
+          </a:p>
+          <a:p>
+            <a:endParaRPr lang="es-ES_tradnl" dirty="0">
               <a:solidFill>
                 <a:schemeClr val="bg1"/>
               </a:solidFill>
             </a:endParaRPr>
           </a:p>
+          <a:p>
+            <a:r>
+              <a:rPr lang="es-ES_tradnl" dirty="0">
+                <a:solidFill>
+                  <a:schemeClr val="bg1"/>
+                </a:solidFill>
+              </a:rPr>
+              <a:t>En la función </a:t>
+            </a:r>
+            <a:r>
+              <a:rPr lang="es-ES_tradnl" dirty="0" err="1">
+                <a:solidFill>
+                  <a:schemeClr val="bg1"/>
+                </a:solidFill>
+              </a:rPr>
+              <a:t>setup</a:t>
+            </a:r>
+            <a:r>
+              <a:rPr lang="es-ES_tradnl" dirty="0">
+                <a:solidFill>
+                  <a:schemeClr val="bg1"/>
+                </a:solidFill>
+              </a:rPr>
+              <a:t> inicializamos el </a:t>
+            </a:r>
+            <a:r>
+              <a:rPr lang="es-ES_tradnl" dirty="0" err="1">
+                <a:solidFill>
+                  <a:schemeClr val="bg1"/>
+                </a:solidFill>
+              </a:rPr>
+              <a:t>WifiManager</a:t>
+            </a:r>
+            <a:r>
+              <a:rPr lang="es-ES_tradnl" dirty="0">
+                <a:solidFill>
+                  <a:schemeClr val="bg1"/>
+                </a:solidFill>
+              </a:rPr>
+              <a:t> (se encarga de crear una red wifi para que configuremos la conexión al </a:t>
+            </a:r>
+            <a:r>
+              <a:rPr lang="es-ES_tradnl" dirty="0" err="1">
+                <a:solidFill>
+                  <a:schemeClr val="bg1"/>
+                </a:solidFill>
+              </a:rPr>
+              <a:t>router</a:t>
+            </a:r>
+            <a:r>
+              <a:rPr lang="es-ES_tradnl" dirty="0">
+                <a:solidFill>
+                  <a:schemeClr val="bg1"/>
+                </a:solidFill>
+              </a:rPr>
+              <a:t>, en caso de no poder conectarse a ninguna red al arrancar) e inicializamos el sensor de pulso (“</a:t>
+            </a:r>
+            <a:r>
+              <a:rPr lang="es-ES_tradnl" b="1" i="1" dirty="0" err="1">
+                <a:solidFill>
+                  <a:schemeClr val="bg1"/>
+                </a:solidFill>
+              </a:rPr>
+              <a:t>particleSensor</a:t>
+            </a:r>
+            <a:r>
+              <a:rPr lang="es-ES_tradnl" dirty="0">
+                <a:solidFill>
+                  <a:schemeClr val="bg1"/>
+                </a:solidFill>
+              </a:rPr>
+              <a:t>”)</a:t>
+            </a:r>
+          </a:p>
+          <a:p>
+            <a:endParaRPr lang="es-ES_tradnl" dirty="0">
+              <a:solidFill>
+                <a:schemeClr val="bg1"/>
+              </a:solidFill>
+            </a:endParaRPr>
+          </a:p>
+          <a:p>
+            <a:r>
+              <a:rPr lang="es-ES_tradnl" dirty="0">
+                <a:solidFill>
+                  <a:schemeClr val="bg1"/>
+                </a:solidFill>
+              </a:rPr>
+              <a:t>La conexión con el sensor de pulso se hace mediante el protocolo I2C.</a:t>
+            </a:r>
+          </a:p>
         </p:txBody>
       </p:sp>
     </p:spTree>
     <p:extLst>
       <p:ext uri="{BB962C8B-B14F-4D97-AF65-F5344CB8AC3E}">
-        <p14:creationId xmlns:p14="http://schemas.microsoft.com/office/powerpoint/2010/main" val="549060676"/>
+        <p14:creationId xmlns:p14="http://schemas.microsoft.com/office/powerpoint/2010/main" val="1187168056"/>
       </p:ext>
     </p:extLst>
   </p:cSld>
@@ -4510,7 +4826,801 @@
 </p:sld>
 </file>
 
-<file path=ppt/slides/slide13.xml><?xml version="1.0" encoding="utf-8"?>
+<file path=ppt/slides/slide14.xml><?xml version="1.0" encoding="utf-8"?>
+<p:sld xmlns:a="http://schemas.openxmlformats.org/drawingml/2006/main" xmlns:r="http://schemas.openxmlformats.org/officeDocument/2006/relationships" xmlns:p="http://schemas.openxmlformats.org/presentationml/2006/main">
+  <p:cSld>
+    <p:bg>
+      <p:bgPr>
+        <a:solidFill>
+          <a:srgbClr val="1E1E1E"/>
+        </a:solidFill>
+        <a:effectLst/>
+      </p:bgPr>
+    </p:bg>
+    <p:spTree>
+      <p:nvGrpSpPr>
+        <p:cNvPr id="1" name=""/>
+        <p:cNvGrpSpPr/>
+        <p:nvPr/>
+      </p:nvGrpSpPr>
+      <p:grpSpPr>
+        <a:xfrm>
+          <a:off x="0" y="0"/>
+          <a:ext cx="0" cy="0"/>
+          <a:chOff x="0" y="0"/>
+          <a:chExt cx="0" cy="0"/>
+        </a:xfrm>
+      </p:grpSpPr>
+      <p:pic>
+        <p:nvPicPr>
+          <p:cNvPr id="7" name="Picture 6">
+            <a:extLst>
+              <a:ext uri="{FF2B5EF4-FFF2-40B4-BE49-F238E27FC236}">
+                <a16:creationId xmlns:a16="http://schemas.microsoft.com/office/drawing/2014/main" id="{A022B22F-6E0B-409D-A750-BCDDDEA5CC85}"/>
+              </a:ext>
+            </a:extLst>
+          </p:cNvPr>
+          <p:cNvPicPr>
+            <a:picLocks noChangeAspect="1"/>
+          </p:cNvPicPr>
+          <p:nvPr/>
+        </p:nvPicPr>
+        <p:blipFill>
+          <a:blip r:embed="rId2"/>
+          <a:stretch>
+            <a:fillRect/>
+          </a:stretch>
+        </p:blipFill>
+        <p:spPr>
+          <a:xfrm>
+            <a:off x="240630" y="1066951"/>
+            <a:ext cx="5668512" cy="5791049"/>
+          </a:xfrm>
+          <a:prstGeom prst="rect">
+            <a:avLst/>
+          </a:prstGeom>
+        </p:spPr>
+      </p:pic>
+      <p:sp>
+        <p:nvSpPr>
+          <p:cNvPr id="12" name="Rectangle 11">
+            <a:extLst>
+              <a:ext uri="{FF2B5EF4-FFF2-40B4-BE49-F238E27FC236}">
+                <a16:creationId xmlns:a16="http://schemas.microsoft.com/office/drawing/2014/main" id="{4EB16812-7D5F-4B72-8676-26C19E31057C}"/>
+              </a:ext>
+            </a:extLst>
+          </p:cNvPr>
+          <p:cNvSpPr/>
+          <p:nvPr/>
+        </p:nvSpPr>
+        <p:spPr>
+          <a:xfrm>
+            <a:off x="-368300" y="-175845"/>
+            <a:ext cx="12979400" cy="1242796"/>
+          </a:xfrm>
+          <a:prstGeom prst="rect">
+            <a:avLst/>
+          </a:prstGeom>
+          <a:solidFill>
+            <a:srgbClr val="795548"/>
+          </a:solidFill>
+          <a:ln w="38100">
+            <a:solidFill>
+              <a:schemeClr val="bg1"/>
+            </a:solidFill>
+          </a:ln>
+        </p:spPr>
+        <p:style>
+          <a:lnRef idx="2">
+            <a:schemeClr val="accent1">
+              <a:shade val="50000"/>
+            </a:schemeClr>
+          </a:lnRef>
+          <a:fillRef idx="1">
+            <a:schemeClr val="accent1"/>
+          </a:fillRef>
+          <a:effectRef idx="0">
+            <a:schemeClr val="accent1"/>
+          </a:effectRef>
+          <a:fontRef idx="minor">
+            <a:schemeClr val="lt1"/>
+          </a:fontRef>
+        </p:style>
+        <p:txBody>
+          <a:bodyPr rtlCol="0" anchor="ctr"/>
+          <a:lstStyle/>
+          <a:p>
+            <a:pPr algn="ctr"/>
+            <a:endParaRPr lang="es-ES"/>
+          </a:p>
+        </p:txBody>
+      </p:sp>
+      <p:sp>
+        <p:nvSpPr>
+          <p:cNvPr id="2" name="Title 1">
+            <a:extLst>
+              <a:ext uri="{FF2B5EF4-FFF2-40B4-BE49-F238E27FC236}">
+                <a16:creationId xmlns:a16="http://schemas.microsoft.com/office/drawing/2014/main" id="{C043F681-95B9-4B4D-9AA6-F9365F5FA1E6}"/>
+              </a:ext>
+            </a:extLst>
+          </p:cNvPr>
+          <p:cNvSpPr>
+            <a:spLocks noGrp="1"/>
+          </p:cNvSpPr>
+          <p:nvPr>
+            <p:ph type="title"/>
+          </p:nvPr>
+        </p:nvSpPr>
+        <p:spPr>
+          <a:xfrm>
+            <a:off x="4622800" y="318478"/>
+            <a:ext cx="7404100" cy="748473"/>
+          </a:xfrm>
+        </p:spPr>
+        <p:txBody>
+          <a:bodyPr/>
+          <a:lstStyle/>
+          <a:p>
+            <a:pPr algn="r"/>
+            <a:r>
+              <a:rPr lang="en-US" i="1" dirty="0" err="1">
+                <a:solidFill>
+                  <a:schemeClr val="bg1"/>
+                </a:solidFill>
+              </a:rPr>
+              <a:t>Captura</a:t>
+            </a:r>
+            <a:r>
+              <a:rPr lang="en-US" i="1" dirty="0">
+                <a:solidFill>
+                  <a:schemeClr val="bg1"/>
+                </a:solidFill>
+              </a:rPr>
+              <a:t> del </a:t>
+            </a:r>
+            <a:r>
+              <a:rPr lang="en-US" i="1" dirty="0" err="1">
+                <a:solidFill>
+                  <a:schemeClr val="bg1"/>
+                </a:solidFill>
+              </a:rPr>
+              <a:t>pulso</a:t>
+            </a:r>
+            <a:r>
+              <a:rPr lang="en-US" i="1" dirty="0">
+                <a:solidFill>
+                  <a:schemeClr val="bg1"/>
+                </a:solidFill>
+              </a:rPr>
+              <a:t>: </a:t>
+            </a:r>
+            <a:r>
+              <a:rPr lang="en-US" b="1" dirty="0">
+                <a:solidFill>
+                  <a:schemeClr val="bg1"/>
+                </a:solidFill>
+              </a:rPr>
+              <a:t>Arduino</a:t>
+            </a:r>
+          </a:p>
+        </p:txBody>
+      </p:sp>
+      <p:sp>
+        <p:nvSpPr>
+          <p:cNvPr id="5" name="TextBox 4">
+            <a:extLst>
+              <a:ext uri="{FF2B5EF4-FFF2-40B4-BE49-F238E27FC236}">
+                <a16:creationId xmlns:a16="http://schemas.microsoft.com/office/drawing/2014/main" id="{0927CAF2-6CAA-4A77-B575-AC64278E6C02}"/>
+              </a:ext>
+            </a:extLst>
+          </p:cNvPr>
+          <p:cNvSpPr txBox="1"/>
+          <p:nvPr/>
+        </p:nvSpPr>
+        <p:spPr>
+          <a:xfrm>
+            <a:off x="6518072" y="1720840"/>
+            <a:ext cx="4831800" cy="3416320"/>
+          </a:xfrm>
+          <a:prstGeom prst="rect">
+            <a:avLst/>
+          </a:prstGeom>
+          <a:noFill/>
+          <a:ln w="38100">
+            <a:noFill/>
+          </a:ln>
+        </p:spPr>
+        <p:txBody>
+          <a:bodyPr wrap="square" rtlCol="0">
+            <a:spAutoFit/>
+          </a:bodyPr>
+          <a:lstStyle/>
+          <a:p>
+            <a:r>
+              <a:rPr lang="es-ES_tradnl" dirty="0">
+                <a:solidFill>
+                  <a:schemeClr val="bg1"/>
+                </a:solidFill>
+              </a:rPr>
+              <a:t>En la función </a:t>
+            </a:r>
+            <a:r>
+              <a:rPr lang="es-ES_tradnl" dirty="0" err="1">
+                <a:solidFill>
+                  <a:schemeClr val="bg1"/>
+                </a:solidFill>
+              </a:rPr>
+              <a:t>loop</a:t>
+            </a:r>
+            <a:r>
+              <a:rPr lang="es-ES_tradnl" dirty="0">
+                <a:solidFill>
+                  <a:schemeClr val="bg1"/>
+                </a:solidFill>
+              </a:rPr>
+              <a:t>() empezamos por comprobar si la intensidad de infrarrojos es mayor que un umbral (dedo encima del sensor) y esperamos que haya un pulso (“</a:t>
+            </a:r>
+            <a:r>
+              <a:rPr lang="es-ES_tradnl" b="1" i="1" dirty="0" err="1">
+                <a:solidFill>
+                  <a:schemeClr val="bg1"/>
+                </a:solidFill>
+              </a:rPr>
+              <a:t>checkForBeat</a:t>
+            </a:r>
+            <a:r>
+              <a:rPr lang="es-ES_tradnl" b="1" i="1" dirty="0">
+                <a:solidFill>
+                  <a:schemeClr val="bg1"/>
+                </a:solidFill>
+              </a:rPr>
+              <a:t>()</a:t>
+            </a:r>
+            <a:r>
+              <a:rPr lang="es-ES_tradnl" dirty="0">
+                <a:solidFill>
+                  <a:schemeClr val="bg1"/>
+                </a:solidFill>
+              </a:rPr>
+              <a:t>”).</a:t>
+            </a:r>
+          </a:p>
+          <a:p>
+            <a:endParaRPr lang="es-ES_tradnl" dirty="0">
+              <a:solidFill>
+                <a:schemeClr val="bg1"/>
+              </a:solidFill>
+            </a:endParaRPr>
+          </a:p>
+          <a:p>
+            <a:r>
+              <a:rPr lang="es-ES_tradnl" dirty="0">
+                <a:solidFill>
+                  <a:schemeClr val="bg1"/>
+                </a:solidFill>
+              </a:rPr>
+              <a:t>Cuando lo encontramos (valor booleano de si o no) guardamos ese milisegundo y hacemos cálculos con los milisegundos anteriores para calcular la media de pulsaciones.</a:t>
+            </a:r>
+          </a:p>
+          <a:p>
+            <a:endParaRPr lang="es-ES_tradnl" dirty="0">
+              <a:solidFill>
+                <a:schemeClr val="bg1"/>
+              </a:solidFill>
+            </a:endParaRPr>
+          </a:p>
+          <a:p>
+            <a:r>
+              <a:rPr lang="es-ES_tradnl" dirty="0">
+                <a:solidFill>
+                  <a:schemeClr val="bg1"/>
+                </a:solidFill>
+              </a:rPr>
+              <a:t>Al final mandamos el pulso por el USB (“</a:t>
+            </a:r>
+            <a:r>
+              <a:rPr lang="es-ES_tradnl" b="1" i="1" dirty="0" err="1">
+                <a:solidFill>
+                  <a:schemeClr val="bg1"/>
+                </a:solidFill>
+              </a:rPr>
+              <a:t>Serial.println</a:t>
+            </a:r>
+            <a:r>
+              <a:rPr lang="es-ES_tradnl" b="1" i="1" dirty="0">
+                <a:solidFill>
+                  <a:schemeClr val="bg1"/>
+                </a:solidFill>
+              </a:rPr>
+              <a:t>()</a:t>
+            </a:r>
+            <a:r>
+              <a:rPr lang="es-ES_tradnl" dirty="0">
+                <a:solidFill>
+                  <a:schemeClr val="bg1"/>
+                </a:solidFill>
+              </a:rPr>
+              <a:t>”).</a:t>
+            </a:r>
+          </a:p>
+        </p:txBody>
+      </p:sp>
+    </p:spTree>
+    <p:extLst>
+      <p:ext uri="{BB962C8B-B14F-4D97-AF65-F5344CB8AC3E}">
+        <p14:creationId xmlns:p14="http://schemas.microsoft.com/office/powerpoint/2010/main" val="4139701111"/>
+      </p:ext>
+    </p:extLst>
+  </p:cSld>
+  <p:clrMapOvr>
+    <a:masterClrMapping/>
+  </p:clrMapOvr>
+</p:sld>
+</file>
+
+<file path=ppt/slides/slide15.xml><?xml version="1.0" encoding="utf-8"?>
+<p:sld xmlns:a="http://schemas.openxmlformats.org/drawingml/2006/main" xmlns:r="http://schemas.openxmlformats.org/officeDocument/2006/relationships" xmlns:p="http://schemas.openxmlformats.org/presentationml/2006/main">
+  <p:cSld>
+    <p:bg>
+      <p:bgPr>
+        <a:solidFill>
+          <a:srgbClr val="1E1E1E"/>
+        </a:solidFill>
+        <a:effectLst/>
+      </p:bgPr>
+    </p:bg>
+    <p:spTree>
+      <p:nvGrpSpPr>
+        <p:cNvPr id="1" name=""/>
+        <p:cNvGrpSpPr/>
+        <p:nvPr/>
+      </p:nvGrpSpPr>
+      <p:grpSpPr>
+        <a:xfrm>
+          <a:off x="0" y="0"/>
+          <a:ext cx="0" cy="0"/>
+          <a:chOff x="0" y="0"/>
+          <a:chExt cx="0" cy="0"/>
+        </a:xfrm>
+      </p:grpSpPr>
+      <p:sp>
+        <p:nvSpPr>
+          <p:cNvPr id="12" name="Rectangle 11">
+            <a:extLst>
+              <a:ext uri="{FF2B5EF4-FFF2-40B4-BE49-F238E27FC236}">
+                <a16:creationId xmlns:a16="http://schemas.microsoft.com/office/drawing/2014/main" id="{4EB16812-7D5F-4B72-8676-26C19E31057C}"/>
+              </a:ext>
+            </a:extLst>
+          </p:cNvPr>
+          <p:cNvSpPr/>
+          <p:nvPr/>
+        </p:nvSpPr>
+        <p:spPr>
+          <a:xfrm>
+            <a:off x="-368300" y="-175845"/>
+            <a:ext cx="12979400" cy="1242796"/>
+          </a:xfrm>
+          <a:prstGeom prst="rect">
+            <a:avLst/>
+          </a:prstGeom>
+          <a:solidFill>
+            <a:srgbClr val="795548"/>
+          </a:solidFill>
+          <a:ln w="38100">
+            <a:solidFill>
+              <a:schemeClr val="bg1"/>
+            </a:solidFill>
+          </a:ln>
+        </p:spPr>
+        <p:style>
+          <a:lnRef idx="2">
+            <a:schemeClr val="accent1">
+              <a:shade val="50000"/>
+            </a:schemeClr>
+          </a:lnRef>
+          <a:fillRef idx="1">
+            <a:schemeClr val="accent1"/>
+          </a:fillRef>
+          <a:effectRef idx="0">
+            <a:schemeClr val="accent1"/>
+          </a:effectRef>
+          <a:fontRef idx="minor">
+            <a:schemeClr val="lt1"/>
+          </a:fontRef>
+        </p:style>
+        <p:txBody>
+          <a:bodyPr rtlCol="0" anchor="ctr"/>
+          <a:lstStyle/>
+          <a:p>
+            <a:pPr algn="ctr"/>
+            <a:endParaRPr lang="es-ES"/>
+          </a:p>
+        </p:txBody>
+      </p:sp>
+      <p:sp>
+        <p:nvSpPr>
+          <p:cNvPr id="2" name="Title 1">
+            <a:extLst>
+              <a:ext uri="{FF2B5EF4-FFF2-40B4-BE49-F238E27FC236}">
+                <a16:creationId xmlns:a16="http://schemas.microsoft.com/office/drawing/2014/main" id="{C043F681-95B9-4B4D-9AA6-F9365F5FA1E6}"/>
+              </a:ext>
+            </a:extLst>
+          </p:cNvPr>
+          <p:cNvSpPr>
+            <a:spLocks noGrp="1"/>
+          </p:cNvSpPr>
+          <p:nvPr>
+            <p:ph type="title"/>
+          </p:nvPr>
+        </p:nvSpPr>
+        <p:spPr>
+          <a:xfrm>
+            <a:off x="4622800" y="318478"/>
+            <a:ext cx="7404100" cy="748473"/>
+          </a:xfrm>
+        </p:spPr>
+        <p:txBody>
+          <a:bodyPr/>
+          <a:lstStyle/>
+          <a:p>
+            <a:pPr algn="r"/>
+            <a:r>
+              <a:rPr lang="en-US" i="1" dirty="0" err="1">
+                <a:solidFill>
+                  <a:schemeClr val="bg1"/>
+                </a:solidFill>
+              </a:rPr>
+              <a:t>Captura</a:t>
+            </a:r>
+            <a:r>
+              <a:rPr lang="en-US" i="1" dirty="0">
+                <a:solidFill>
+                  <a:schemeClr val="bg1"/>
+                </a:solidFill>
+              </a:rPr>
+              <a:t> del </a:t>
+            </a:r>
+            <a:r>
+              <a:rPr lang="en-US" i="1" dirty="0" err="1">
+                <a:solidFill>
+                  <a:schemeClr val="bg1"/>
+                </a:solidFill>
+              </a:rPr>
+              <a:t>pulso</a:t>
+            </a:r>
+            <a:r>
+              <a:rPr lang="en-US" i="1" dirty="0">
+                <a:solidFill>
+                  <a:schemeClr val="bg1"/>
+                </a:solidFill>
+              </a:rPr>
+              <a:t>: </a:t>
+            </a:r>
+            <a:r>
+              <a:rPr lang="en-US" b="1" dirty="0">
+                <a:solidFill>
+                  <a:schemeClr val="bg1"/>
+                </a:solidFill>
+              </a:rPr>
+              <a:t>Arduino</a:t>
+            </a:r>
+          </a:p>
+        </p:txBody>
+      </p:sp>
+      <p:pic>
+        <p:nvPicPr>
+          <p:cNvPr id="3" name="Picture 2">
+            <a:extLst>
+              <a:ext uri="{FF2B5EF4-FFF2-40B4-BE49-F238E27FC236}">
+                <a16:creationId xmlns:a16="http://schemas.microsoft.com/office/drawing/2014/main" id="{1C7BC17E-F523-4387-ABE0-A721DD7D715A}"/>
+              </a:ext>
+            </a:extLst>
+          </p:cNvPr>
+          <p:cNvPicPr>
+            <a:picLocks noChangeAspect="1"/>
+          </p:cNvPicPr>
+          <p:nvPr/>
+        </p:nvPicPr>
+        <p:blipFill>
+          <a:blip r:embed="rId2"/>
+          <a:stretch>
+            <a:fillRect/>
+          </a:stretch>
+        </p:blipFill>
+        <p:spPr>
+          <a:xfrm>
+            <a:off x="7392021" y="3695307"/>
+            <a:ext cx="4395150" cy="2410744"/>
+          </a:xfrm>
+          <a:prstGeom prst="rect">
+            <a:avLst/>
+          </a:prstGeom>
+        </p:spPr>
+      </p:pic>
+      <p:sp>
+        <p:nvSpPr>
+          <p:cNvPr id="4" name="TextBox 3">
+            <a:extLst>
+              <a:ext uri="{FF2B5EF4-FFF2-40B4-BE49-F238E27FC236}">
+                <a16:creationId xmlns:a16="http://schemas.microsoft.com/office/drawing/2014/main" id="{545FD59F-A8C1-4AC0-87CB-E799DBA4ABA1}"/>
+              </a:ext>
+            </a:extLst>
+          </p:cNvPr>
+          <p:cNvSpPr txBox="1"/>
+          <p:nvPr/>
+        </p:nvSpPr>
+        <p:spPr>
+          <a:xfrm>
+            <a:off x="7392021" y="1972693"/>
+            <a:ext cx="3497344" cy="584775"/>
+          </a:xfrm>
+          <a:prstGeom prst="rect">
+            <a:avLst/>
+          </a:prstGeom>
+          <a:noFill/>
+        </p:spPr>
+        <p:txBody>
+          <a:bodyPr wrap="square" rtlCol="0">
+            <a:spAutoFit/>
+          </a:bodyPr>
+          <a:lstStyle/>
+          <a:p>
+            <a:pPr algn="ctr"/>
+            <a:r>
+              <a:rPr lang="es-ES_tradnl" sz="3200" b="1" dirty="0">
+                <a:solidFill>
+                  <a:schemeClr val="bg1"/>
+                </a:solidFill>
+              </a:rPr>
+              <a:t>{ pulse: “120” }</a:t>
+            </a:r>
+          </a:p>
+        </p:txBody>
+      </p:sp>
+      <p:sp>
+        <p:nvSpPr>
+          <p:cNvPr id="6" name="Arrow: Down 5">
+            <a:extLst>
+              <a:ext uri="{FF2B5EF4-FFF2-40B4-BE49-F238E27FC236}">
+                <a16:creationId xmlns:a16="http://schemas.microsoft.com/office/drawing/2014/main" id="{D50F73A1-BC86-468B-BF81-0629FD3B7F5B}"/>
+              </a:ext>
+            </a:extLst>
+          </p:cNvPr>
+          <p:cNvSpPr/>
+          <p:nvPr/>
+        </p:nvSpPr>
+        <p:spPr>
+          <a:xfrm>
+            <a:off x="8719794" y="2690213"/>
+            <a:ext cx="527901" cy="772998"/>
+          </a:xfrm>
+          <a:prstGeom prst="downArrow">
+            <a:avLst/>
+          </a:prstGeom>
+          <a:solidFill>
+            <a:srgbClr val="795548"/>
+          </a:solidFill>
+          <a:ln>
+            <a:solidFill>
+              <a:schemeClr val="bg1"/>
+            </a:solidFill>
+          </a:ln>
+        </p:spPr>
+        <p:style>
+          <a:lnRef idx="2">
+            <a:schemeClr val="accent1">
+              <a:shade val="50000"/>
+            </a:schemeClr>
+          </a:lnRef>
+          <a:fillRef idx="1">
+            <a:schemeClr val="accent1"/>
+          </a:fillRef>
+          <a:effectRef idx="0">
+            <a:schemeClr val="accent1"/>
+          </a:effectRef>
+          <a:fontRef idx="minor">
+            <a:schemeClr val="lt1"/>
+          </a:fontRef>
+        </p:style>
+        <p:txBody>
+          <a:bodyPr rtlCol="0" anchor="ctr"/>
+          <a:lstStyle/>
+          <a:p>
+            <a:pPr algn="ctr"/>
+            <a:endParaRPr lang="es-ES_tradnl"/>
+          </a:p>
+        </p:txBody>
+      </p:sp>
+      <p:sp>
+        <p:nvSpPr>
+          <p:cNvPr id="8" name="Rectangle 7">
+            <a:extLst>
+              <a:ext uri="{FF2B5EF4-FFF2-40B4-BE49-F238E27FC236}">
+                <a16:creationId xmlns:a16="http://schemas.microsoft.com/office/drawing/2014/main" id="{93D283D2-0F79-42B5-B526-96325CDD8E12}"/>
+              </a:ext>
+            </a:extLst>
+          </p:cNvPr>
+          <p:cNvSpPr/>
+          <p:nvPr/>
+        </p:nvSpPr>
+        <p:spPr>
+          <a:xfrm>
+            <a:off x="8804635" y="3849710"/>
+            <a:ext cx="678730" cy="188536"/>
+          </a:xfrm>
+          <a:prstGeom prst="rect">
+            <a:avLst/>
+          </a:prstGeom>
+          <a:noFill/>
+          <a:ln w="28575">
+            <a:solidFill>
+              <a:srgbClr val="795548"/>
+            </a:solidFill>
+          </a:ln>
+        </p:spPr>
+        <p:style>
+          <a:lnRef idx="2">
+            <a:schemeClr val="accent1">
+              <a:shade val="50000"/>
+            </a:schemeClr>
+          </a:lnRef>
+          <a:fillRef idx="1">
+            <a:schemeClr val="accent1"/>
+          </a:fillRef>
+          <a:effectRef idx="0">
+            <a:schemeClr val="accent1"/>
+          </a:effectRef>
+          <a:fontRef idx="minor">
+            <a:schemeClr val="lt1"/>
+          </a:fontRef>
+        </p:style>
+        <p:txBody>
+          <a:bodyPr rtlCol="0" anchor="ctr"/>
+          <a:lstStyle/>
+          <a:p>
+            <a:pPr algn="ctr"/>
+            <a:endParaRPr lang="es-ES_tradnl"/>
+          </a:p>
+        </p:txBody>
+      </p:sp>
+      <p:sp>
+        <p:nvSpPr>
+          <p:cNvPr id="10" name="TextBox 9">
+            <a:extLst>
+              <a:ext uri="{FF2B5EF4-FFF2-40B4-BE49-F238E27FC236}">
+                <a16:creationId xmlns:a16="http://schemas.microsoft.com/office/drawing/2014/main" id="{C911BC98-FBE6-4789-A090-A7A6B0645FB6}"/>
+              </a:ext>
+            </a:extLst>
+          </p:cNvPr>
+          <p:cNvSpPr txBox="1"/>
+          <p:nvPr/>
+        </p:nvSpPr>
+        <p:spPr>
+          <a:xfrm>
+            <a:off x="803494" y="2191586"/>
+            <a:ext cx="5474758" cy="3693319"/>
+          </a:xfrm>
+          <a:prstGeom prst="rect">
+            <a:avLst/>
+          </a:prstGeom>
+          <a:noFill/>
+          <a:ln w="38100">
+            <a:noFill/>
+          </a:ln>
+        </p:spPr>
+        <p:txBody>
+          <a:bodyPr wrap="square" rtlCol="0">
+            <a:spAutoFit/>
+          </a:bodyPr>
+          <a:lstStyle/>
+          <a:p>
+            <a:r>
+              <a:rPr lang="es-ES_tradnl" dirty="0">
+                <a:solidFill>
+                  <a:schemeClr val="bg1"/>
+                </a:solidFill>
+              </a:rPr>
+              <a:t>La cadena de texto con la información en formato JSON es luego capturada por la clase Java nativa de Android y procesada.</a:t>
+            </a:r>
+          </a:p>
+          <a:p>
+            <a:endParaRPr lang="es-ES_tradnl" dirty="0">
+              <a:solidFill>
+                <a:schemeClr val="bg1"/>
+              </a:solidFill>
+            </a:endParaRPr>
+          </a:p>
+          <a:p>
+            <a:r>
+              <a:rPr lang="es-ES_tradnl" dirty="0">
+                <a:solidFill>
+                  <a:schemeClr val="bg1"/>
+                </a:solidFill>
+              </a:rPr>
+              <a:t>Cuando todo esta correcto y el usuario pulsa el botón “Guardar”, se le devuelve el valor “_beat” al widget de </a:t>
+            </a:r>
+            <a:r>
+              <a:rPr lang="es-ES_tradnl" b="1" i="1" dirty="0" err="1">
+                <a:solidFill>
+                  <a:schemeClr val="bg1"/>
+                </a:solidFill>
+              </a:rPr>
+              <a:t>Flutter</a:t>
+            </a:r>
+            <a:r>
+              <a:rPr lang="es-ES_tradnl" dirty="0">
+                <a:solidFill>
+                  <a:schemeClr val="bg1"/>
+                </a:solidFill>
+              </a:rPr>
+              <a:t> para su posterior envío al servidor.</a:t>
+            </a:r>
+          </a:p>
+          <a:p>
+            <a:endParaRPr lang="es-ES_tradnl" dirty="0">
+              <a:solidFill>
+                <a:schemeClr val="bg1"/>
+              </a:solidFill>
+            </a:endParaRPr>
+          </a:p>
+          <a:p>
+            <a:r>
+              <a:rPr lang="es-ES_tradnl" dirty="0">
+                <a:solidFill>
+                  <a:schemeClr val="bg1"/>
+                </a:solidFill>
+              </a:rPr>
+              <a:t>Como dije al principio, no todo se puede hacer con </a:t>
+            </a:r>
+            <a:r>
+              <a:rPr lang="es-ES_tradnl" b="1" i="1" dirty="0" err="1">
+                <a:solidFill>
+                  <a:schemeClr val="bg1"/>
+                </a:solidFill>
+              </a:rPr>
+              <a:t>Flutter</a:t>
+            </a:r>
+            <a:r>
+              <a:rPr lang="es-ES_tradnl" dirty="0">
+                <a:solidFill>
+                  <a:schemeClr val="bg1"/>
+                </a:solidFill>
+              </a:rPr>
+              <a:t>, y aunque esto si, era mas claro desarrollarlo nativamente en Android y conectarlo a </a:t>
+            </a:r>
+            <a:r>
+              <a:rPr lang="es-ES_tradnl" b="1" i="1" dirty="0" err="1">
+                <a:solidFill>
+                  <a:schemeClr val="bg1"/>
+                </a:solidFill>
+              </a:rPr>
+              <a:t>Flutter</a:t>
+            </a:r>
+            <a:r>
+              <a:rPr lang="es-ES_tradnl" dirty="0">
+                <a:solidFill>
+                  <a:schemeClr val="bg1"/>
+                </a:solidFill>
+              </a:rPr>
+              <a:t>. En cualquier caso, iOS es un sistema muy cerrado y no permite el acceso al USB a cualquier aplicación.</a:t>
+            </a:r>
+          </a:p>
+        </p:txBody>
+      </p:sp>
+    </p:spTree>
+    <p:extLst>
+      <p:ext uri="{BB962C8B-B14F-4D97-AF65-F5344CB8AC3E}">
+        <p14:creationId xmlns:p14="http://schemas.microsoft.com/office/powerpoint/2010/main" val="3084372120"/>
+      </p:ext>
+    </p:extLst>
+  </p:cSld>
+  <p:clrMapOvr>
+    <a:masterClrMapping/>
+  </p:clrMapOvr>
+</p:sld>
+</file>
+
+<file path=ppt/slides/slide16.xml><?xml version="1.0" encoding="utf-8"?>
 <p:sld xmlns:a="http://schemas.openxmlformats.org/drawingml/2006/main" xmlns:r="http://schemas.openxmlformats.org/officeDocument/2006/relationships" xmlns:p="http://schemas.openxmlformats.org/presentationml/2006/main">
   <p:cSld>
     <p:bg>

</xml_diff>